<commit_message>
Timings update plus added working reach/3 with path memory
</commit_message>
<xml_diff>
--- a/ATAI_Presentation Hyper.pptx
+++ b/ATAI_Presentation Hyper.pptx
@@ -129,18 +129,18 @@
   <pc:docChgLst>
     <pc:chgData name="Al ex" userId="1d73023b5acb93cf" providerId="LiveId" clId="{A69545E9-AE12-4501-89D7-98D9D1617476}"/>
     <pc:docChg chg="modSld">
-      <pc:chgData name="Al ex" userId="1d73023b5acb93cf" providerId="LiveId" clId="{A69545E9-AE12-4501-89D7-98D9D1617476}" dt="2021-07-03T12:53:21.857" v="30" actId="20577"/>
+      <pc:chgData name="Al ex" userId="1d73023b5acb93cf" providerId="LiveId" clId="{A69545E9-AE12-4501-89D7-98D9D1617476}" dt="2021-07-03T15:31:47.666" v="42" actId="20577"/>
       <pc:docMkLst>
         <pc:docMk/>
       </pc:docMkLst>
       <pc:sldChg chg="modSp mod">
-        <pc:chgData name="Al ex" userId="1d73023b5acb93cf" providerId="LiveId" clId="{A69545E9-AE12-4501-89D7-98D9D1617476}" dt="2021-07-03T12:53:21.857" v="30" actId="20577"/>
+        <pc:chgData name="Al ex" userId="1d73023b5acb93cf" providerId="LiveId" clId="{A69545E9-AE12-4501-89D7-98D9D1617476}" dt="2021-07-03T15:31:47.666" v="42" actId="20577"/>
         <pc:sldMkLst>
           <pc:docMk/>
           <pc:sldMk cId="3869130354" sldId="272"/>
         </pc:sldMkLst>
         <pc:graphicFrameChg chg="modGraphic">
-          <ac:chgData name="Al ex" userId="1d73023b5acb93cf" providerId="LiveId" clId="{A69545E9-AE12-4501-89D7-98D9D1617476}" dt="2021-07-03T12:53:21.857" v="30" actId="20577"/>
+          <ac:chgData name="Al ex" userId="1d73023b5acb93cf" providerId="LiveId" clId="{A69545E9-AE12-4501-89D7-98D9D1617476}" dt="2021-07-03T15:31:47.666" v="42" actId="20577"/>
           <ac:graphicFrameMkLst>
             <pc:docMk/>
             <pc:sldMk cId="3869130354" sldId="272"/>
@@ -8058,7 +8058,7 @@
             <p:ph idx="1"/>
             <p:extLst>
               <p:ext uri="{D42A27DB-BD31-4B8C-83A1-F6EECF244321}">
-                <p14:modId xmlns:p14="http://schemas.microsoft.com/office/powerpoint/2010/main" val="4104606546"/>
+                <p14:modId xmlns:p14="http://schemas.microsoft.com/office/powerpoint/2010/main" val="1320244233"/>
               </p:ext>
             </p:extLst>
           </p:nvPr>
@@ -8393,7 +8393,10 @@
                     <a:lstStyle/>
                     <a:p>
                       <a:pPr algn="ctr"/>
-                      <a:endParaRPr lang="de-AT"/>
+                      <a:r>
+                        <a:rPr lang="de-AT" dirty="0"/>
+                        <a:t>0.703 s</a:t>
+                      </a:r>
                     </a:p>
                   </a:txBody>
                   <a:tcPr/>

</xml_diff>